<commit_message>
barra de navegacao horizontal
</commit_message>
<xml_diff>
--- a/Projeto 1/Entrega01.pptx
+++ b/Projeto 1/Entrega01.pptx
@@ -3808,7 +3808,7 @@
           <a:p>
             <a:fld id="{DDD670B3-E2EA-4637-9A35-A3F69C814A4D}" type="datetimeFigureOut">
               <a:rPr lang="pt-BR" smtClean="0"/>
-              <a:t>22/08/2017</a:t>
+              <a:t>25/08/2017</a:t>
             </a:fld>
             <a:endParaRPr lang="pt-BR"/>
           </a:p>
@@ -4022,7 +4022,7 @@
           <a:p>
             <a:fld id="{DDD670B3-E2EA-4637-9A35-A3F69C814A4D}" type="datetimeFigureOut">
               <a:rPr lang="pt-BR" smtClean="0"/>
-              <a:t>22/08/2017</a:t>
+              <a:t>25/08/2017</a:t>
             </a:fld>
             <a:endParaRPr lang="pt-BR"/>
           </a:p>
@@ -4246,7 +4246,7 @@
           <a:p>
             <a:fld id="{DDD670B3-E2EA-4637-9A35-A3F69C814A4D}" type="datetimeFigureOut">
               <a:rPr lang="pt-BR" smtClean="0"/>
-              <a:t>22/08/2017</a:t>
+              <a:t>25/08/2017</a:t>
             </a:fld>
             <a:endParaRPr lang="pt-BR"/>
           </a:p>
@@ -4460,7 +4460,7 @@
           <a:p>
             <a:fld id="{DDD670B3-E2EA-4637-9A35-A3F69C814A4D}" type="datetimeFigureOut">
               <a:rPr lang="pt-BR" smtClean="0"/>
-              <a:t>22/08/2017</a:t>
+              <a:t>25/08/2017</a:t>
             </a:fld>
             <a:endParaRPr lang="pt-BR"/>
           </a:p>
@@ -4750,7 +4750,7 @@
           <a:p>
             <a:fld id="{DDD670B3-E2EA-4637-9A35-A3F69C814A4D}" type="datetimeFigureOut">
               <a:rPr lang="pt-BR" smtClean="0"/>
-              <a:t>22/08/2017</a:t>
+              <a:t>25/08/2017</a:t>
             </a:fld>
             <a:endParaRPr lang="pt-BR"/>
           </a:p>
@@ -5026,7 +5026,7 @@
           <a:p>
             <a:fld id="{DDD670B3-E2EA-4637-9A35-A3F69C814A4D}" type="datetimeFigureOut">
               <a:rPr lang="pt-BR" smtClean="0"/>
-              <a:t>22/08/2017</a:t>
+              <a:t>25/08/2017</a:t>
             </a:fld>
             <a:endParaRPr lang="pt-BR"/>
           </a:p>
@@ -5437,7 +5437,7 @@
           <a:p>
             <a:fld id="{DDD670B3-E2EA-4637-9A35-A3F69C814A4D}" type="datetimeFigureOut">
               <a:rPr lang="pt-BR" smtClean="0"/>
-              <a:t>22/08/2017</a:t>
+              <a:t>25/08/2017</a:t>
             </a:fld>
             <a:endParaRPr lang="pt-BR"/>
           </a:p>
@@ -5599,7 +5599,7 @@
           <a:p>
             <a:fld id="{DDD670B3-E2EA-4637-9A35-A3F69C814A4D}" type="datetimeFigureOut">
               <a:rPr lang="pt-BR" smtClean="0"/>
-              <a:t>22/08/2017</a:t>
+              <a:t>25/08/2017</a:t>
             </a:fld>
             <a:endParaRPr lang="pt-BR"/>
           </a:p>
@@ -5738,7 +5738,7 @@
           <a:p>
             <a:fld id="{DDD670B3-E2EA-4637-9A35-A3F69C814A4D}" type="datetimeFigureOut">
               <a:rPr lang="pt-BR" smtClean="0"/>
-              <a:t>22/08/2017</a:t>
+              <a:t>25/08/2017</a:t>
             </a:fld>
             <a:endParaRPr lang="pt-BR"/>
           </a:p>
@@ -6059,7 +6059,7 @@
           <a:p>
             <a:fld id="{DDD670B3-E2EA-4637-9A35-A3F69C814A4D}" type="datetimeFigureOut">
               <a:rPr lang="pt-BR" smtClean="0"/>
-              <a:t>22/08/2017</a:t>
+              <a:t>25/08/2017</a:t>
             </a:fld>
             <a:endParaRPr lang="pt-BR"/>
           </a:p>
@@ -6360,7 +6360,7 @@
           <a:p>
             <a:fld id="{DDD670B3-E2EA-4637-9A35-A3F69C814A4D}" type="datetimeFigureOut">
               <a:rPr lang="pt-BR" smtClean="0"/>
-              <a:t>22/08/2017</a:t>
+              <a:t>25/08/2017</a:t>
             </a:fld>
             <a:endParaRPr lang="pt-BR"/>
           </a:p>
@@ -6617,7 +6617,7 @@
           <a:p>
             <a:fld id="{DDD670B3-E2EA-4637-9A35-A3F69C814A4D}" type="datetimeFigureOut">
               <a:rPr lang="pt-BR" smtClean="0"/>
-              <a:t>22/08/2017</a:t>
+              <a:t>25/08/2017</a:t>
             </a:fld>
             <a:endParaRPr lang="pt-BR"/>
           </a:p>
@@ -7478,7 +7478,7 @@
           <a:p>
             <a:r>
               <a:rPr lang="pt-BR" dirty="0"/>
-              <a:t> https://github.com/vitorsv1/P1-CoDes.git</a:t>
+              <a:t> https://github.com/betofr1/co-design.git</a:t>
             </a:r>
           </a:p>
         </p:txBody>

</xml_diff>